<commit_message>
Update STRATEGIE DE LIVRAISON EFFICACE.pptx
</commit_message>
<xml_diff>
--- a/STRATEGIE DE LIVRAISON EFFICACE.pptx
+++ b/STRATEGIE DE LIVRAISON EFFICACE.pptx
@@ -5819,8 +5819,8 @@
         </p:nvSpPr>
         <p:spPr>
           <a:xfrm>
-            <a:off x="2692398" y="1972731"/>
-            <a:ext cx="6815669" cy="1515533"/>
+            <a:off x="2692398" y="1843315"/>
+            <a:ext cx="6815669" cy="1644950"/>
           </a:xfrm>
         </p:spPr>
         <p:txBody>
@@ -5869,6 +5869,100 @@
               <a:t>SOSHOP &amp; SOTECH</a:t>
             </a:r>
             <a:endParaRPr lang="en-GB" sz="3200" b="1" dirty="0"/>
+          </a:p>
+        </p:txBody>
+      </p:sp>
+      <p:sp>
+        <p:nvSpPr>
+          <p:cNvPr id="4" name="ZoneTexte 3"/>
+          <p:cNvSpPr txBox="1"/>
+          <p:nvPr/>
+        </p:nvSpPr>
+        <p:spPr>
+          <a:xfrm>
+            <a:off x="6375722" y="4978398"/>
+            <a:ext cx="2068195" cy="369332"/>
+          </a:xfrm>
+          <a:prstGeom prst="rect">
+            <a:avLst/>
+          </a:prstGeom>
+          <a:noFill/>
+        </p:spPr>
+        <p:txBody>
+          <a:bodyPr wrap="none" rtlCol="0">
+            <a:spAutoFit/>
+          </a:bodyPr>
+          <a:lstStyle/>
+          <a:p>
+            <a:r>
+              <a:rPr lang="fr-FR" dirty="0" smtClean="0"/>
+              <a:t>YÉBOUÉ Anderson</a:t>
+            </a:r>
+            <a:endParaRPr lang="en-GB" dirty="0"/>
+          </a:p>
+        </p:txBody>
+      </p:sp>
+      <p:sp>
+        <p:nvSpPr>
+          <p:cNvPr id="5" name="ZoneTexte 4"/>
+          <p:cNvSpPr txBox="1"/>
+          <p:nvPr/>
+        </p:nvSpPr>
+        <p:spPr>
+          <a:xfrm>
+            <a:off x="2274746" y="4978398"/>
+            <a:ext cx="3408305" cy="369332"/>
+          </a:xfrm>
+          <a:prstGeom prst="rect">
+            <a:avLst/>
+          </a:prstGeom>
+          <a:noFill/>
+        </p:spPr>
+        <p:txBody>
+          <a:bodyPr wrap="none" rtlCol="0">
+            <a:spAutoFit/>
+          </a:bodyPr>
+          <a:lstStyle/>
+          <a:p>
+            <a:r>
+              <a:rPr lang="fr-FR" i="1" u="sng" dirty="0" smtClean="0"/>
+              <a:t>Présenté par</a:t>
+            </a:r>
+            <a:r>
+              <a:rPr lang="fr-FR" dirty="0" smtClean="0"/>
+              <a:t>: 		TOURE Élisée</a:t>
+            </a:r>
+            <a:endParaRPr lang="en-GB" dirty="0"/>
+          </a:p>
+        </p:txBody>
+      </p:sp>
+      <p:sp>
+        <p:nvSpPr>
+          <p:cNvPr id="6" name="ZoneTexte 5"/>
+          <p:cNvSpPr txBox="1"/>
+          <p:nvPr/>
+        </p:nvSpPr>
+        <p:spPr>
+          <a:xfrm>
+            <a:off x="5909227" y="4934856"/>
+            <a:ext cx="352982" cy="369332"/>
+          </a:xfrm>
+          <a:prstGeom prst="rect">
+            <a:avLst/>
+          </a:prstGeom>
+          <a:noFill/>
+        </p:spPr>
+        <p:txBody>
+          <a:bodyPr wrap="none" rtlCol="0">
+            <a:spAutoFit/>
+          </a:bodyPr>
+          <a:lstStyle/>
+          <a:p>
+            <a:r>
+              <a:rPr lang="fr-FR" dirty="0" smtClean="0"/>
+              <a:t>&amp;</a:t>
+            </a:r>
+            <a:endParaRPr lang="en-GB" dirty="0"/>
           </a:p>
         </p:txBody>
       </p:sp>
@@ -5882,6 +5976,13 @@
   <p:clrMapOvr>
     <a:masterClrMapping/>
   </p:clrMapOvr>
+  <p:timing>
+    <p:tnLst>
+      <p:par>
+        <p:cTn id="1" dur="indefinite" restart="never" nodeType="tmRoot"/>
+      </p:par>
+    </p:tnLst>
+  </p:timing>
 </p:sld>
 </file>
 
@@ -6103,6 +6204,13 @@
   <p:clrMapOvr>
     <a:masterClrMapping/>
   </p:clrMapOvr>
+  <p:timing>
+    <p:tnLst>
+      <p:par>
+        <p:cTn id="1" dur="indefinite" restart="never" nodeType="tmRoot"/>
+      </p:par>
+    </p:tnLst>
+  </p:timing>
 </p:sld>
 </file>
 
@@ -6142,32 +6250,405 @@
           <a:p>
             <a:r>
               <a:rPr lang="fr-FR" dirty="0" smtClean="0"/>
-              <a:t>Voici ainsi définie, la stratégie de livraison efficace et fiable proposée à Soshop &amp; </a:t>
-            </a:r>
-            <a:r>
-              <a:rPr lang="fr-FR" dirty="0" err="1" smtClean="0"/>
-              <a:t>Sothec</a:t>
+              <a:t>Voici ainsi définie, la stratégie de livraison efficace et fiable proposée à Soshop &amp; Sotech</a:t>
             </a:r>
             <a:endParaRPr lang="en-GB" dirty="0"/>
           </a:p>
         </p:txBody>
       </p:sp>
-      <p:sp>
-        <p:nvSpPr>
-          <p:cNvPr id="3" name="Espace réservé du contenu 2"/>
-          <p:cNvSpPr>
-            <a:spLocks noGrp="1"/>
-          </p:cNvSpPr>
+      <p:pic>
+        <p:nvPicPr>
+          <p:cNvPr id="4" name="Espace réservé du contenu 3"/>
+          <p:cNvPicPr>
+            <a:picLocks noGrp="1" noChangeAspect="1"/>
+          </p:cNvPicPr>
           <p:nvPr>
             <p:ph idx="1"/>
           </p:nvPr>
-        </p:nvSpPr>
-        <p:spPr/>
-        <p:txBody>
-          <a:bodyPr/>
-          <a:lstStyle/>
-          <a:p>
-            <a:endParaRPr lang="en-GB" dirty="0"/>
+        </p:nvPicPr>
+        <p:blipFill>
+          <a:blip r:embed="rId2">
+            <a:extLst>
+              <a:ext uri="{28A0092B-C50C-407E-A947-70E740481C1C}">
+                <a14:useLocalDpi xmlns:a14="http://schemas.microsoft.com/office/drawing/2010/main" val="0"/>
+              </a:ext>
+            </a:extLst>
+          </a:blip>
+          <a:stretch>
+            <a:fillRect/>
+          </a:stretch>
+        </p:blipFill>
+        <p:spPr>
+          <a:xfrm>
+            <a:off x="1858510" y="2786743"/>
+            <a:ext cx="2508024" cy="2508024"/>
+          </a:xfrm>
+        </p:spPr>
+      </p:pic>
+      <p:pic>
+        <p:nvPicPr>
+          <p:cNvPr id="5" name="Espace réservé du contenu 3"/>
+          <p:cNvPicPr>
+            <a:picLocks noChangeAspect="1"/>
+          </p:cNvPicPr>
+          <p:nvPr/>
+        </p:nvPicPr>
+        <p:blipFill>
+          <a:blip r:embed="rId3">
+            <a:extLst>
+              <a:ext uri="{28A0092B-C50C-407E-A947-70E740481C1C}">
+                <a14:useLocalDpi xmlns:a14="http://schemas.microsoft.com/office/drawing/2010/main" val="0"/>
+              </a:ext>
+            </a:extLst>
+          </a:blip>
+          <a:stretch>
+            <a:fillRect/>
+          </a:stretch>
+        </p:blipFill>
+        <p:spPr>
+          <a:xfrm>
+            <a:off x="7242629" y="2786743"/>
+            <a:ext cx="2508024" cy="2508024"/>
+          </a:xfrm>
+          <a:prstGeom prst="rect">
+            <a:avLst/>
+          </a:prstGeom>
+          <a:ln>
+            <a:solidFill>
+              <a:schemeClr val="tx1"/>
+            </a:solidFill>
+          </a:ln>
+        </p:spPr>
+      </p:pic>
+      <p:sp>
+        <p:nvSpPr>
+          <p:cNvPr id="6" name="Rectangle 5"/>
+          <p:cNvSpPr/>
+          <p:nvPr/>
+        </p:nvSpPr>
+        <p:spPr>
+          <a:xfrm>
+            <a:off x="5067039" y="2786743"/>
+            <a:ext cx="1475084" cy="2215991"/>
+          </a:xfrm>
+          <a:prstGeom prst="rect">
+            <a:avLst/>
+          </a:prstGeom>
+          <a:noFill/>
+        </p:spPr>
+        <p:txBody>
+          <a:bodyPr wrap="none" lIns="91440" tIns="45720" rIns="91440" bIns="45720">
+            <a:spAutoFit/>
+          </a:bodyPr>
+          <a:lstStyle/>
+          <a:p>
+            <a:pPr algn="ctr"/>
+            <a:r>
+              <a:rPr lang="fr-FR" sz="13800" b="0" cap="none" spc="0" dirty="0" smtClean="0">
+                <a:ln w="0"/>
+                <a:solidFill>
+                  <a:schemeClr val="tx1"/>
+                </a:solidFill>
+                <a:effectLst>
+                  <a:outerShdw blurRad="38100" dist="19050" dir="2700000" algn="tl" rotWithShape="0">
+                    <a:schemeClr val="dk1">
+                      <a:alpha val="40000"/>
+                    </a:schemeClr>
+                  </a:outerShdw>
+                </a:effectLst>
+              </a:rPr>
+              <a:t>&amp;</a:t>
+            </a:r>
+            <a:endParaRPr lang="fr-FR" sz="13800" b="0" cap="none" spc="0" dirty="0">
+              <a:ln w="0"/>
+              <a:solidFill>
+                <a:schemeClr val="tx1"/>
+              </a:solidFill>
+              <a:effectLst>
+                <a:outerShdw blurRad="38100" dist="19050" dir="2700000" algn="tl" rotWithShape="0">
+                  <a:schemeClr val="dk1">
+                    <a:alpha val="40000"/>
+                  </a:schemeClr>
+                </a:outerShdw>
+              </a:effectLst>
+            </a:endParaRPr>
+          </a:p>
+        </p:txBody>
+      </p:sp>
+      <p:sp>
+        <p:nvSpPr>
+          <p:cNvPr id="7" name="Espace réservé du contenu 2"/>
+          <p:cNvSpPr txBox="1">
+            <a:spLocks/>
+          </p:cNvSpPr>
+          <p:nvPr/>
+        </p:nvSpPr>
+        <p:spPr>
+          <a:xfrm>
+            <a:off x="1295402" y="5403624"/>
+            <a:ext cx="9601196" cy="783773"/>
+          </a:xfrm>
+          <a:prstGeom prst="rect">
+            <a:avLst/>
+          </a:prstGeom>
+        </p:spPr>
+        <p:txBody>
+          <a:bodyPr vert="horz" lIns="91440" tIns="45720" rIns="91440" bIns="45720" rtlCol="0" anchor="t">
+            <a:normAutofit fontScale="85000" lnSpcReduction="20000"/>
+          </a:bodyPr>
+          <a:lstStyle>
+            <a:lvl1pPr marL="285750" indent="-285750" algn="l" defTabSz="457200" rtl="0" eaLnBrk="1" latinLnBrk="0" hangingPunct="1">
+              <a:spcBef>
+                <a:spcPct val="20000"/>
+              </a:spcBef>
+              <a:spcAft>
+                <a:spcPts val="600"/>
+              </a:spcAft>
+              <a:buClr>
+                <a:schemeClr val="accent1"/>
+              </a:buClr>
+              <a:buSzPct val="115000"/>
+              <a:buFont typeface="Arial"/>
+              <a:buChar char="•"/>
+              <a:defRPr sz="2400" kern="1200" cap="none">
+                <a:solidFill>
+                  <a:schemeClr val="tx1">
+                    <a:lumMod val="85000"/>
+                    <a:lumOff val="15000"/>
+                  </a:schemeClr>
+                </a:solidFill>
+                <a:effectLst/>
+                <a:latin typeface="+mn-lt"/>
+                <a:ea typeface="+mn-ea"/>
+                <a:cs typeface="+mn-cs"/>
+              </a:defRPr>
+            </a:lvl1pPr>
+            <a:lvl2pPr marL="742950" indent="-285750" algn="l" defTabSz="457200" rtl="0" eaLnBrk="1" latinLnBrk="0" hangingPunct="1">
+              <a:spcBef>
+                <a:spcPct val="20000"/>
+              </a:spcBef>
+              <a:spcAft>
+                <a:spcPts val="600"/>
+              </a:spcAft>
+              <a:buClr>
+                <a:schemeClr val="accent1"/>
+              </a:buClr>
+              <a:buSzPct val="115000"/>
+              <a:buFont typeface="Arial"/>
+              <a:buChar char="•"/>
+              <a:defRPr sz="2000" kern="1200" cap="none">
+                <a:solidFill>
+                  <a:schemeClr val="tx1">
+                    <a:lumMod val="85000"/>
+                    <a:lumOff val="15000"/>
+                  </a:schemeClr>
+                </a:solidFill>
+                <a:effectLst/>
+                <a:latin typeface="+mn-lt"/>
+                <a:ea typeface="+mn-ea"/>
+                <a:cs typeface="+mn-cs"/>
+              </a:defRPr>
+            </a:lvl2pPr>
+            <a:lvl3pPr marL="1200150" indent="-285750" algn="l" defTabSz="457200" rtl="0" eaLnBrk="1" latinLnBrk="0" hangingPunct="1">
+              <a:spcBef>
+                <a:spcPct val="20000"/>
+              </a:spcBef>
+              <a:spcAft>
+                <a:spcPts val="600"/>
+              </a:spcAft>
+              <a:buClr>
+                <a:schemeClr val="accent1"/>
+              </a:buClr>
+              <a:buSzPct val="115000"/>
+              <a:buFont typeface="Arial"/>
+              <a:buChar char="•"/>
+              <a:defRPr sz="1800" kern="1200" cap="none">
+                <a:solidFill>
+                  <a:schemeClr val="tx1">
+                    <a:lumMod val="85000"/>
+                    <a:lumOff val="15000"/>
+                  </a:schemeClr>
+                </a:solidFill>
+                <a:effectLst/>
+                <a:latin typeface="+mn-lt"/>
+                <a:ea typeface="+mn-ea"/>
+                <a:cs typeface="+mn-cs"/>
+              </a:defRPr>
+            </a:lvl3pPr>
+            <a:lvl4pPr marL="1543050" indent="-171450" algn="l" defTabSz="457200" rtl="0" eaLnBrk="1" latinLnBrk="0" hangingPunct="1">
+              <a:spcBef>
+                <a:spcPct val="20000"/>
+              </a:spcBef>
+              <a:spcAft>
+                <a:spcPts val="600"/>
+              </a:spcAft>
+              <a:buClr>
+                <a:schemeClr val="accent1"/>
+              </a:buClr>
+              <a:buSzPct val="115000"/>
+              <a:buFont typeface="Arial"/>
+              <a:buChar char="•"/>
+              <a:defRPr sz="1600" kern="1200" cap="none">
+                <a:solidFill>
+                  <a:schemeClr val="tx1">
+                    <a:lumMod val="85000"/>
+                    <a:lumOff val="15000"/>
+                  </a:schemeClr>
+                </a:solidFill>
+                <a:effectLst/>
+                <a:latin typeface="+mn-lt"/>
+                <a:ea typeface="+mn-ea"/>
+                <a:cs typeface="+mn-cs"/>
+              </a:defRPr>
+            </a:lvl4pPr>
+            <a:lvl5pPr marL="2000250" indent="-171450" algn="l" defTabSz="457200" rtl="0" eaLnBrk="1" latinLnBrk="0" hangingPunct="1">
+              <a:spcBef>
+                <a:spcPct val="20000"/>
+              </a:spcBef>
+              <a:spcAft>
+                <a:spcPts val="600"/>
+              </a:spcAft>
+              <a:buClr>
+                <a:schemeClr val="accent1"/>
+              </a:buClr>
+              <a:buSzPct val="115000"/>
+              <a:buFont typeface="Arial"/>
+              <a:buChar char="•"/>
+              <a:defRPr sz="1400" kern="1200" cap="none">
+                <a:solidFill>
+                  <a:schemeClr val="tx1">
+                    <a:lumMod val="85000"/>
+                    <a:lumOff val="15000"/>
+                  </a:schemeClr>
+                </a:solidFill>
+                <a:effectLst/>
+                <a:latin typeface="+mn-lt"/>
+                <a:ea typeface="+mn-ea"/>
+                <a:cs typeface="+mn-cs"/>
+              </a:defRPr>
+            </a:lvl5pPr>
+            <a:lvl6pPr marL="2514600" indent="-228600" algn="l" defTabSz="457200" rtl="0" eaLnBrk="1" latinLnBrk="0" hangingPunct="1">
+              <a:spcBef>
+                <a:spcPct val="20000"/>
+              </a:spcBef>
+              <a:spcAft>
+                <a:spcPts val="600"/>
+              </a:spcAft>
+              <a:buClr>
+                <a:schemeClr val="accent1"/>
+              </a:buClr>
+              <a:buSzPct val="115000"/>
+              <a:buFont typeface="Arial"/>
+              <a:buChar char="•"/>
+              <a:defRPr sz="1400" kern="1200" cap="none">
+                <a:solidFill>
+                  <a:schemeClr val="tx1">
+                    <a:lumMod val="85000"/>
+                    <a:lumOff val="15000"/>
+                  </a:schemeClr>
+                </a:solidFill>
+                <a:effectLst/>
+                <a:latin typeface="+mn-lt"/>
+                <a:ea typeface="+mn-ea"/>
+                <a:cs typeface="+mn-cs"/>
+              </a:defRPr>
+            </a:lvl6pPr>
+            <a:lvl7pPr marL="2971800" indent="-228600" algn="l" defTabSz="457200" rtl="0" eaLnBrk="1" latinLnBrk="0" hangingPunct="1">
+              <a:spcBef>
+                <a:spcPct val="20000"/>
+              </a:spcBef>
+              <a:spcAft>
+                <a:spcPts val="600"/>
+              </a:spcAft>
+              <a:buClr>
+                <a:schemeClr val="accent1"/>
+              </a:buClr>
+              <a:buSzPct val="115000"/>
+              <a:buFont typeface="Arial"/>
+              <a:buChar char="•"/>
+              <a:defRPr sz="1400" kern="1200" cap="none">
+                <a:solidFill>
+                  <a:schemeClr val="tx1">
+                    <a:lumMod val="85000"/>
+                    <a:lumOff val="15000"/>
+                  </a:schemeClr>
+                </a:solidFill>
+                <a:effectLst/>
+                <a:latin typeface="+mn-lt"/>
+                <a:ea typeface="+mn-ea"/>
+                <a:cs typeface="+mn-cs"/>
+              </a:defRPr>
+            </a:lvl7pPr>
+            <a:lvl8pPr marL="3429000" indent="-228600" algn="l" defTabSz="457200" rtl="0" eaLnBrk="1" latinLnBrk="0" hangingPunct="1">
+              <a:spcBef>
+                <a:spcPct val="20000"/>
+              </a:spcBef>
+              <a:spcAft>
+                <a:spcPts val="600"/>
+              </a:spcAft>
+              <a:buClr>
+                <a:schemeClr val="accent1"/>
+              </a:buClr>
+              <a:buSzPct val="115000"/>
+              <a:buFont typeface="Arial"/>
+              <a:buChar char="•"/>
+              <a:defRPr sz="1400" kern="1200" cap="none">
+                <a:solidFill>
+                  <a:schemeClr val="tx1">
+                    <a:lumMod val="85000"/>
+                    <a:lumOff val="15000"/>
+                  </a:schemeClr>
+                </a:solidFill>
+                <a:effectLst/>
+                <a:latin typeface="+mn-lt"/>
+                <a:ea typeface="+mn-ea"/>
+                <a:cs typeface="+mn-cs"/>
+              </a:defRPr>
+            </a:lvl8pPr>
+            <a:lvl9pPr marL="3886200" indent="-228600" algn="l" defTabSz="457200" rtl="0" eaLnBrk="1" latinLnBrk="0" hangingPunct="1">
+              <a:spcBef>
+                <a:spcPct val="20000"/>
+              </a:spcBef>
+              <a:spcAft>
+                <a:spcPts val="600"/>
+              </a:spcAft>
+              <a:buClr>
+                <a:schemeClr val="accent1"/>
+              </a:buClr>
+              <a:buSzPct val="115000"/>
+              <a:buFont typeface="Arial"/>
+              <a:buChar char="•"/>
+              <a:defRPr sz="1400" kern="1200" cap="none">
+                <a:solidFill>
+                  <a:schemeClr val="tx1">
+                    <a:lumMod val="85000"/>
+                    <a:lumOff val="15000"/>
+                  </a:schemeClr>
+                </a:solidFill>
+                <a:effectLst/>
+                <a:latin typeface="+mn-lt"/>
+                <a:ea typeface="+mn-ea"/>
+                <a:cs typeface="+mn-cs"/>
+              </a:defRPr>
+            </a:lvl9pPr>
+          </a:lstStyle>
+          <a:p>
+            <a:pPr marL="0" indent="0" algn="just">
+              <a:buNone/>
+            </a:pPr>
+            <a:r>
+              <a:rPr lang="fr-FR" sz="3200" b="1" u="sng" dirty="0" smtClean="0"/>
+              <a:t>N.B</a:t>
+            </a:r>
+            <a:r>
+              <a:rPr lang="fr-FR" sz="3200" b="1" dirty="0" smtClean="0"/>
+              <a:t>: </a:t>
+            </a:r>
+            <a:r>
+              <a:rPr lang="fr-FR" sz="3200" i="1" dirty="0" smtClean="0"/>
+              <a:t>Le budget pour la livraison dépend du nombre de livraison que fait Soshop &amp; Sotech par jour, donc de son chiffre d’affaire.</a:t>
+            </a:r>
+            <a:endParaRPr lang="en-GB" sz="3200" i="1" dirty="0"/>
           </a:p>
         </p:txBody>
       </p:sp>
@@ -6181,6 +6662,13 @@
   <p:clrMapOvr>
     <a:masterClrMapping/>
   </p:clrMapOvr>
+  <p:timing>
+    <p:tnLst>
+      <p:par>
+        <p:cTn id="1" dur="indefinite" restart="never" nodeType="tmRoot"/>
+      </p:par>
+    </p:tnLst>
+  </p:timing>
 </p:sld>
 </file>
 
@@ -6246,15 +6734,7 @@
             </a:pPr>
             <a:r>
               <a:rPr lang="fr-FR" sz="3200" dirty="0" smtClean="0"/>
-              <a:t>Il s’agit ici de définir le type de livraison que Soshop &amp; </a:t>
-            </a:r>
-            <a:r>
-              <a:rPr lang="fr-FR" sz="3200" dirty="0" err="1" smtClean="0"/>
-              <a:t>Sotech</a:t>
-            </a:r>
-            <a:r>
-              <a:rPr lang="fr-FR" sz="3200" dirty="0" smtClean="0"/>
-              <a:t> pourra adopter pour faire livrer ses produits sur toute l’étendue de son marché, dans le temps et en dépensant le moins possible.</a:t>
+              <a:t>Il s’agit ici de définir le type de livraison que Soshop &amp; Sotech pourra adopter pour faire livrer ses produits sur toute l’étendue de son marché, dans le temps et en dépensant le moins possible.</a:t>
             </a:r>
             <a:endParaRPr lang="en-GB" sz="3200" dirty="0"/>
           </a:p>
@@ -6270,6 +6750,13 @@
   <p:clrMapOvr>
     <a:masterClrMapping/>
   </p:clrMapOvr>
+  <p:timing>
+    <p:tnLst>
+      <p:par>
+        <p:cTn id="1" dur="indefinite" restart="never" nodeType="tmRoot"/>
+      </p:par>
+    </p:tnLst>
+  </p:timing>
 </p:sld>
 </file>
 
@@ -6339,15 +6826,7 @@
             </a:r>
             <a:r>
               <a:rPr lang="fr-FR" sz="3200" dirty="0" smtClean="0"/>
-              <a:t> &amp; </a:t>
-            </a:r>
-            <a:r>
-              <a:rPr lang="fr-FR" sz="3200" dirty="0" err="1" smtClean="0"/>
-              <a:t>Sotech</a:t>
-            </a:r>
-            <a:r>
-              <a:rPr lang="fr-FR" sz="3200" dirty="0" smtClean="0"/>
-              <a:t>, étant une petite entreprise, a besoin d’un service de livraison bon marché, mais aussi qui couvre l’étendue de la ville d’Abidjan et de l’intérieur du pays, selon ses ambitions de croissance.</a:t>
+              <a:t> &amp; Sotech, étant une petite entreprise, a besoin d’un service de livraison bon marché, mais aussi qui couvre l’étendue de la ville d’Abidjan et de l’intérieur du pays, selon ses ambitions de croissance.</a:t>
             </a:r>
           </a:p>
           <a:p>
@@ -6372,6 +6851,13 @@
   <p:clrMapOvr>
     <a:masterClrMapping/>
   </p:clrMapOvr>
+  <p:timing>
+    <p:tnLst>
+      <p:par>
+        <p:cTn id="1" dur="indefinite" restart="never" nodeType="tmRoot"/>
+      </p:par>
+    </p:tnLst>
+  </p:timing>
 </p:sld>
 </file>
 
@@ -6470,15 +6956,7 @@
             </a:pPr>
             <a:r>
               <a:rPr lang="fr-FR" sz="3200" dirty="0" smtClean="0"/>
-              <a:t>Vue la lourde charge que représente la possession de son propre service de livraison, il convient pour Soshop &amp; </a:t>
-            </a:r>
-            <a:r>
-              <a:rPr lang="fr-FR" sz="3200" dirty="0" err="1" smtClean="0"/>
-              <a:t>Sotech</a:t>
-            </a:r>
-            <a:r>
-              <a:rPr lang="fr-FR" sz="3200" dirty="0" smtClean="0"/>
-              <a:t> de:</a:t>
+              <a:t>Vue la lourde charge que représente la possession de son propre service de livraison, il convient pour Soshop &amp; Sotech de:</a:t>
             </a:r>
           </a:p>
           <a:p>
@@ -6501,6 +6979,13 @@
   <p:clrMapOvr>
     <a:masterClrMapping/>
   </p:clrMapOvr>
+  <p:timing>
+    <p:tnLst>
+      <p:par>
+        <p:cTn id="1" dur="indefinite" restart="never" nodeType="tmRoot"/>
+      </p:par>
+    </p:tnLst>
+  </p:timing>
 </p:sld>
 </file>
 
@@ -6589,6 +7074,13 @@
   <p:clrMapOvr>
     <a:masterClrMapping/>
   </p:clrMapOvr>
+  <p:timing>
+    <p:tnLst>
+      <p:par>
+        <p:cTn id="1" dur="indefinite" restart="never" nodeType="tmRoot"/>
+      </p:par>
+    </p:tnLst>
+  </p:timing>
 </p:sld>
 </file>
 
@@ -6756,6 +7248,13 @@
   <p:clrMapOvr>
     <a:masterClrMapping/>
   </p:clrMapOvr>
+  <p:timing>
+    <p:tnLst>
+      <p:par>
+        <p:cTn id="1" dur="indefinite" restart="never" nodeType="tmRoot"/>
+      </p:par>
+    </p:tnLst>
+  </p:timing>
 </p:sld>
 </file>
 
@@ -6914,6 +7413,13 @@
   <p:clrMapOvr>
     <a:masterClrMapping/>
   </p:clrMapOvr>
+  <p:timing>
+    <p:tnLst>
+      <p:par>
+        <p:cTn id="1" dur="indefinite" restart="never" nodeType="tmRoot"/>
+      </p:par>
+    </p:tnLst>
+  </p:timing>
 </p:sld>
 </file>
 
@@ -7072,6 +7578,13 @@
   <p:clrMapOvr>
     <a:masterClrMapping/>
   </p:clrMapOvr>
+  <p:timing>
+    <p:tnLst>
+      <p:par>
+        <p:cTn id="1" dur="indefinite" restart="never" nodeType="tmRoot"/>
+      </p:par>
+    </p:tnLst>
+  </p:timing>
 </p:sld>
 </file>
 
@@ -7209,6 +7722,13 @@
   <p:clrMapOvr>
     <a:masterClrMapping/>
   </p:clrMapOvr>
+  <p:timing>
+    <p:tnLst>
+      <p:par>
+        <p:cTn id="1" dur="indefinite" restart="never" nodeType="tmRoot"/>
+      </p:par>
+    </p:tnLst>
+  </p:timing>
 </p:sld>
 </file>
 

</xml_diff>